<commit_message>
Remove document lock file.
</commit_message>
<xml_diff>
--- a/documents/LabX - Java Plays - REST data services.pptx
+++ b/documents/LabX - Java Plays - REST data services.pptx
@@ -24,6 +24,8 @@
     <p:sldId id="267" r:id="rId17"/>
     <p:sldId id="268" r:id="rId18"/>
     <p:sldId id="269" r:id="rId19"/>
+    <p:sldId id="270" r:id="rId20"/>
+    <p:sldId id="271" r:id="rId21"/>
   </p:sldIdLst>
   <p:sldSz cx="12193587" cy="6858000"/>
   <p:notesSz cx="6858000" cy="9144000"/>
@@ -199,7 +201,7 @@
           <a:bodyPr lIns="0" rIns="0" tIns="0" bIns="0" anchor="b"/>
           <a:p>
             <a:pPr algn="r"/>
-            <a:fld id="{0DE6CA90-4A38-4FDB-89DD-CAD1FC8BB774}" type="slidenum">
+            <a:fld id="{728CCCD2-668A-4364-9F9A-8FC03639D55B}" type="slidenum">
               <a:rPr lang="en-US" sz="1400" spc="-1">
                 <a:latin typeface="Times New Roman"/>
               </a:rPr>
@@ -234,7 +236,7 @@
       </p:grpSpPr>
       <p:sp>
         <p:nvSpPr>
-          <p:cNvPr id="211" name="PlaceHolder 1"/>
+          <p:cNvPr id="215" name="PlaceHolder 1"/>
           <p:cNvSpPr>
             <a:spLocks noGrp="1"/>
           </p:cNvSpPr>
@@ -260,7 +262,7 @@
       </p:sp>
       <p:sp>
         <p:nvSpPr>
-          <p:cNvPr id="212" name="CustomShape 2"/>
+          <p:cNvPr id="216" name="CustomShape 2"/>
           <p:cNvSpPr/>
           <p:nvPr/>
         </p:nvSpPr>
@@ -291,7 +293,7 @@
                 <a:spcPct val="100000"/>
               </a:lnSpc>
             </a:pPr>
-            <a:fld id="{4C68DAAA-C223-4E94-AC75-CCC2701D0857}" type="slidenum">
+            <a:fld id="{1364D822-CF2D-4B34-86F7-20582131208B}" type="slidenum">
               <a:rPr lang="en-US" sz="1400" spc="-1" strike="noStrike">
                 <a:solidFill>
                   <a:srgbClr val="000000"/>
@@ -334,7 +336,7 @@
       </p:grpSpPr>
       <p:sp>
         <p:nvSpPr>
-          <p:cNvPr id="229" name="CustomShape 1"/>
+          <p:cNvPr id="233" name="CustomShape 1"/>
           <p:cNvSpPr/>
           <p:nvPr/>
         </p:nvSpPr>
@@ -365,7 +367,7 @@
                 <a:spcPct val="100000"/>
               </a:lnSpc>
             </a:pPr>
-            <a:fld id="{6B44E72F-FBDC-4849-A6F2-57E1C884462D}" type="slidenum">
+            <a:fld id="{EEAECC29-4175-495A-8C77-4D429971C5E2}" type="slidenum">
               <a:rPr lang="en-US" sz="1400" spc="-1" strike="noStrike">
                 <a:solidFill>
                   <a:srgbClr val="000000"/>
@@ -386,7 +388,7 @@
       </p:sp>
       <p:sp>
         <p:nvSpPr>
-          <p:cNvPr id="230" name="PlaceHolder 2"/>
+          <p:cNvPr id="234" name="PlaceHolder 2"/>
           <p:cNvSpPr>
             <a:spLocks noGrp="1"/>
           </p:cNvSpPr>
@@ -434,7 +436,7 @@
       </p:grpSpPr>
       <p:sp>
         <p:nvSpPr>
-          <p:cNvPr id="231" name="CustomShape 1"/>
+          <p:cNvPr id="235" name="CustomShape 1"/>
           <p:cNvSpPr/>
           <p:nvPr/>
         </p:nvSpPr>
@@ -465,7 +467,7 @@
                 <a:spcPct val="100000"/>
               </a:lnSpc>
             </a:pPr>
-            <a:fld id="{272E7056-6583-4256-98BF-7AAB5D999F1D}" type="slidenum">
+            <a:fld id="{F2E3AAAF-2F57-453B-B62B-B8E0E6BD5505}" type="slidenum">
               <a:rPr lang="en-US" sz="1400" spc="-1" strike="noStrike">
                 <a:solidFill>
                   <a:srgbClr val="000000"/>
@@ -486,7 +488,7 @@
       </p:sp>
       <p:sp>
         <p:nvSpPr>
-          <p:cNvPr id="232" name="PlaceHolder 2"/>
+          <p:cNvPr id="236" name="PlaceHolder 2"/>
           <p:cNvSpPr>
             <a:spLocks noGrp="1"/>
           </p:cNvSpPr>
@@ -534,7 +536,7 @@
       </p:grpSpPr>
       <p:sp>
         <p:nvSpPr>
-          <p:cNvPr id="233" name="CustomShape 1"/>
+          <p:cNvPr id="237" name="CustomShape 1"/>
           <p:cNvSpPr/>
           <p:nvPr/>
         </p:nvSpPr>
@@ -565,7 +567,7 @@
                 <a:spcPct val="100000"/>
               </a:lnSpc>
             </a:pPr>
-            <a:fld id="{9E4D5F1C-2895-46DF-9508-255EB8022307}" type="slidenum">
+            <a:fld id="{12244DDB-56B2-4447-B2ED-ABCD48E8F09D}" type="slidenum">
               <a:rPr lang="en-US" sz="1400" spc="-1" strike="noStrike">
                 <a:solidFill>
                   <a:srgbClr val="000000"/>
@@ -586,7 +588,7 @@
       </p:sp>
       <p:sp>
         <p:nvSpPr>
-          <p:cNvPr id="234" name="PlaceHolder 2"/>
+          <p:cNvPr id="238" name="PlaceHolder 2"/>
           <p:cNvSpPr>
             <a:spLocks noGrp="1"/>
           </p:cNvSpPr>
@@ -634,7 +636,7 @@
       </p:grpSpPr>
       <p:sp>
         <p:nvSpPr>
-          <p:cNvPr id="235" name="CustomShape 1"/>
+          <p:cNvPr id="239" name="CustomShape 1"/>
           <p:cNvSpPr/>
           <p:nvPr/>
         </p:nvSpPr>
@@ -665,7 +667,7 @@
                 <a:spcPct val="100000"/>
               </a:lnSpc>
             </a:pPr>
-            <a:fld id="{693E1984-EB8A-4ADD-B58D-100D57F1A337}" type="slidenum">
+            <a:fld id="{DF8E85F2-C0E9-42FB-B969-8FA773B4995A}" type="slidenum">
               <a:rPr lang="en-US" sz="1400" spc="-1" strike="noStrike">
                 <a:solidFill>
                   <a:srgbClr val="000000"/>
@@ -686,7 +688,207 @@
       </p:sp>
       <p:sp>
         <p:nvSpPr>
-          <p:cNvPr id="236" name="PlaceHolder 2"/>
+          <p:cNvPr id="240" name="PlaceHolder 2"/>
+          <p:cNvSpPr>
+            <a:spLocks noGrp="1"/>
+          </p:cNvSpPr>
+          <p:nvPr>
+            <p:ph type="body"/>
+          </p:nvPr>
+        </p:nvSpPr>
+        <p:spPr>
+          <a:xfrm>
+            <a:off x="685800" y="4343400"/>
+            <a:ext cx="5485320" cy="4113720"/>
+          </a:xfrm>
+          <a:prstGeom prst="rect">
+            <a:avLst/>
+          </a:prstGeom>
+        </p:spPr>
+        <p:txBody>
+          <a:bodyPr lIns="0" rIns="0" tIns="0" bIns="0" anchor="ctr"/>
+          <a:p>
+            <a:endParaRPr/>
+          </a:p>
+        </p:txBody>
+      </p:sp>
+    </p:spTree>
+  </p:cSld>
+</p:notes>
+</file>
+
+<file path=ppt/notesSlides/notesSlide14.xml><?xml version="1.0" encoding="utf-8"?>
+<p:notes xmlns:a="http://schemas.openxmlformats.org/drawingml/2006/main" xmlns:p="http://schemas.openxmlformats.org/presentationml/2006/main" xmlns:r="http://schemas.openxmlformats.org/officeDocument/2006/relationships">
+  <p:cSld>
+    <p:spTree>
+      <p:nvGrpSpPr>
+        <p:cNvPr id="1" name=""/>
+        <p:cNvGrpSpPr/>
+        <p:nvPr/>
+      </p:nvGrpSpPr>
+      <p:grpSpPr>
+        <a:xfrm>
+          <a:off x="0" y="0"/>
+          <a:ext cx="0" cy="0"/>
+          <a:chOff x="0" y="0"/>
+          <a:chExt cx="0" cy="0"/>
+        </a:xfrm>
+      </p:grpSpPr>
+      <p:sp>
+        <p:nvSpPr>
+          <p:cNvPr id="241" name="CustomShape 1"/>
+          <p:cNvSpPr/>
+          <p:nvPr/>
+        </p:nvSpPr>
+        <p:spPr>
+          <a:xfrm>
+            <a:off x="3881520" y="8686800"/>
+            <a:ext cx="2972160" cy="452880"/>
+          </a:xfrm>
+          <a:prstGeom prst="rect">
+            <a:avLst/>
+          </a:prstGeom>
+          <a:noFill/>
+          <a:ln>
+            <a:noFill/>
+          </a:ln>
+        </p:spPr>
+        <p:style>
+          <a:lnRef idx="0"/>
+          <a:fillRef idx="0"/>
+          <a:effectRef idx="0"/>
+          <a:fontRef idx="minor"/>
+        </p:style>
+        <p:txBody>
+          <a:bodyPr lIns="0" rIns="0" tIns="0" bIns="0" anchor="b"/>
+          <a:p>
+            <a:pPr algn="r">
+              <a:lnSpc>
+                <a:spcPct val="100000"/>
+              </a:lnSpc>
+            </a:pPr>
+            <a:fld id="{86CABA81-1887-4F94-9CA3-DE31FA05141F}" type="slidenum">
+              <a:rPr lang="en-US" sz="1400" spc="-1" strike="noStrike">
+                <a:solidFill>
+                  <a:srgbClr val="000000"/>
+                </a:solidFill>
+                <a:uFill>
+                  <a:solidFill>
+                    <a:srgbClr val="ffffff"/>
+                  </a:solidFill>
+                </a:uFill>
+                <a:latin typeface="Arial"/>
+                <a:ea typeface="Lucida Sans Unicode"/>
+              </a:rPr>
+              <a:t>&lt;number&gt;</a:t>
+            </a:fld>
+            <a:endParaRPr/>
+          </a:p>
+        </p:txBody>
+      </p:sp>
+      <p:sp>
+        <p:nvSpPr>
+          <p:cNvPr id="242" name="PlaceHolder 2"/>
+          <p:cNvSpPr>
+            <a:spLocks noGrp="1"/>
+          </p:cNvSpPr>
+          <p:nvPr>
+            <p:ph type="body"/>
+          </p:nvPr>
+        </p:nvSpPr>
+        <p:spPr>
+          <a:xfrm>
+            <a:off x="685800" y="4343400"/>
+            <a:ext cx="5485320" cy="4113720"/>
+          </a:xfrm>
+          <a:prstGeom prst="rect">
+            <a:avLst/>
+          </a:prstGeom>
+        </p:spPr>
+        <p:txBody>
+          <a:bodyPr lIns="0" rIns="0" tIns="0" bIns="0" anchor="ctr"/>
+          <a:p>
+            <a:endParaRPr/>
+          </a:p>
+        </p:txBody>
+      </p:sp>
+    </p:spTree>
+  </p:cSld>
+</p:notes>
+</file>
+
+<file path=ppt/notesSlides/notesSlide15.xml><?xml version="1.0" encoding="utf-8"?>
+<p:notes xmlns:a="http://schemas.openxmlformats.org/drawingml/2006/main" xmlns:p="http://schemas.openxmlformats.org/presentationml/2006/main" xmlns:r="http://schemas.openxmlformats.org/officeDocument/2006/relationships">
+  <p:cSld>
+    <p:spTree>
+      <p:nvGrpSpPr>
+        <p:cNvPr id="1" name=""/>
+        <p:cNvGrpSpPr/>
+        <p:nvPr/>
+      </p:nvGrpSpPr>
+      <p:grpSpPr>
+        <a:xfrm>
+          <a:off x="0" y="0"/>
+          <a:ext cx="0" cy="0"/>
+          <a:chOff x="0" y="0"/>
+          <a:chExt cx="0" cy="0"/>
+        </a:xfrm>
+      </p:grpSpPr>
+      <p:sp>
+        <p:nvSpPr>
+          <p:cNvPr id="243" name="CustomShape 1"/>
+          <p:cNvSpPr/>
+          <p:nvPr/>
+        </p:nvSpPr>
+        <p:spPr>
+          <a:xfrm>
+            <a:off x="3881520" y="8686800"/>
+            <a:ext cx="2972160" cy="452880"/>
+          </a:xfrm>
+          <a:prstGeom prst="rect">
+            <a:avLst/>
+          </a:prstGeom>
+          <a:noFill/>
+          <a:ln>
+            <a:noFill/>
+          </a:ln>
+        </p:spPr>
+        <p:style>
+          <a:lnRef idx="0"/>
+          <a:fillRef idx="0"/>
+          <a:effectRef idx="0"/>
+          <a:fontRef idx="minor"/>
+        </p:style>
+        <p:txBody>
+          <a:bodyPr lIns="0" rIns="0" tIns="0" bIns="0" anchor="b"/>
+          <a:p>
+            <a:pPr algn="r">
+              <a:lnSpc>
+                <a:spcPct val="100000"/>
+              </a:lnSpc>
+            </a:pPr>
+            <a:fld id="{7C821A58-18BA-47AE-AD08-C2D8C916FB31}" type="slidenum">
+              <a:rPr lang="en-US" sz="1400" spc="-1" strike="noStrike">
+                <a:solidFill>
+                  <a:srgbClr val="000000"/>
+                </a:solidFill>
+                <a:uFill>
+                  <a:solidFill>
+                    <a:srgbClr val="ffffff"/>
+                  </a:solidFill>
+                </a:uFill>
+                <a:latin typeface="Arial"/>
+                <a:ea typeface="Lucida Sans Unicode"/>
+              </a:rPr>
+              <a:t>&lt;number&gt;</a:t>
+            </a:fld>
+            <a:endParaRPr/>
+          </a:p>
+        </p:txBody>
+      </p:sp>
+      <p:sp>
+        <p:nvSpPr>
+          <p:cNvPr id="244" name="PlaceHolder 2"/>
           <p:cNvSpPr>
             <a:spLocks noGrp="1"/>
           </p:cNvSpPr>
@@ -734,7 +936,7 @@
       </p:grpSpPr>
       <p:sp>
         <p:nvSpPr>
-          <p:cNvPr id="213" name="CustomShape 1"/>
+          <p:cNvPr id="217" name="CustomShape 1"/>
           <p:cNvSpPr/>
           <p:nvPr/>
         </p:nvSpPr>
@@ -765,7 +967,7 @@
                 <a:spcPct val="100000"/>
               </a:lnSpc>
             </a:pPr>
-            <a:fld id="{2A7322AC-441B-46A1-91B4-72DFEFA725B9}" type="slidenum">
+            <a:fld id="{357372B2-15AF-4116-899B-00B4AE27DE13}" type="slidenum">
               <a:rPr lang="en-US" sz="1400" spc="-1" strike="noStrike">
                 <a:solidFill>
                   <a:srgbClr val="000000"/>
@@ -786,7 +988,7 @@
       </p:sp>
       <p:sp>
         <p:nvSpPr>
-          <p:cNvPr id="214" name="CustomShape 2"/>
+          <p:cNvPr id="218" name="CustomShape 2"/>
           <p:cNvSpPr/>
           <p:nvPr/>
         </p:nvSpPr>
@@ -817,7 +1019,7 @@
                 <a:spcPct val="87000"/>
               </a:lnSpc>
             </a:pPr>
-            <a:fld id="{251C2B86-B956-473C-A97C-051E309AD6C6}" type="slidenum">
+            <a:fld id="{1C03ADEB-53B9-4907-99DF-765E4A0CBE88}" type="slidenum">
               <a:rPr lang="en-US" sz="1400" spc="-1" strike="noStrike">
                 <a:solidFill>
                   <a:srgbClr val="000000"/>
@@ -838,7 +1040,7 @@
       </p:sp>
       <p:sp>
         <p:nvSpPr>
-          <p:cNvPr id="215" name="PlaceHolder 3"/>
+          <p:cNvPr id="219" name="PlaceHolder 3"/>
           <p:cNvSpPr>
             <a:spLocks noGrp="1"/>
           </p:cNvSpPr>
@@ -886,7 +1088,7 @@
       </p:grpSpPr>
       <p:sp>
         <p:nvSpPr>
-          <p:cNvPr id="216" name="CustomShape 1"/>
+          <p:cNvPr id="220" name="CustomShape 1"/>
           <p:cNvSpPr/>
           <p:nvPr/>
         </p:nvSpPr>
@@ -917,7 +1119,7 @@
                 <a:spcPct val="100000"/>
               </a:lnSpc>
             </a:pPr>
-            <a:fld id="{23889B41-CC23-45B0-AFEE-DAE49C6FFA08}" type="slidenum">
+            <a:fld id="{540D2511-5D0F-4966-A93D-BB19A92E46EA}" type="slidenum">
               <a:rPr lang="en-US" sz="1400" spc="-1" strike="noStrike">
                 <a:solidFill>
                   <a:srgbClr val="000000"/>
@@ -938,7 +1140,7 @@
       </p:sp>
       <p:sp>
         <p:nvSpPr>
-          <p:cNvPr id="217" name="CustomShape 2"/>
+          <p:cNvPr id="221" name="CustomShape 2"/>
           <p:cNvSpPr/>
           <p:nvPr/>
         </p:nvSpPr>
@@ -969,7 +1171,7 @@
                 <a:spcPct val="87000"/>
               </a:lnSpc>
             </a:pPr>
-            <a:fld id="{89699B0B-9671-427D-BD82-DD25181F8976}" type="slidenum">
+            <a:fld id="{298F91EB-D659-4F24-9DC3-DDF0F6089FAF}" type="slidenum">
               <a:rPr lang="en-US" sz="1400" spc="-1" strike="noStrike">
                 <a:solidFill>
                   <a:srgbClr val="000000"/>
@@ -990,7 +1192,7 @@
       </p:sp>
       <p:sp>
         <p:nvSpPr>
-          <p:cNvPr id="218" name="PlaceHolder 3"/>
+          <p:cNvPr id="222" name="PlaceHolder 3"/>
           <p:cNvSpPr>
             <a:spLocks noGrp="1"/>
           </p:cNvSpPr>
@@ -1038,7 +1240,7 @@
       </p:grpSpPr>
       <p:sp>
         <p:nvSpPr>
-          <p:cNvPr id="219" name="CustomShape 1"/>
+          <p:cNvPr id="223" name="CustomShape 1"/>
           <p:cNvSpPr/>
           <p:nvPr/>
         </p:nvSpPr>
@@ -1069,7 +1271,7 @@
                 <a:spcPct val="100000"/>
               </a:lnSpc>
             </a:pPr>
-            <a:fld id="{B0150692-F807-4638-9C48-485115312867}" type="slidenum">
+            <a:fld id="{5CD23D53-A764-4D52-BE1C-79B620E706B7}" type="slidenum">
               <a:rPr lang="en-US" sz="1400" spc="-1" strike="noStrike">
                 <a:solidFill>
                   <a:srgbClr val="000000"/>
@@ -1090,7 +1292,7 @@
       </p:sp>
       <p:sp>
         <p:nvSpPr>
-          <p:cNvPr id="220" name="PlaceHolder 2"/>
+          <p:cNvPr id="224" name="PlaceHolder 2"/>
           <p:cNvSpPr>
             <a:spLocks noGrp="1"/>
           </p:cNvSpPr>
@@ -1138,7 +1340,7 @@
       </p:grpSpPr>
       <p:sp>
         <p:nvSpPr>
-          <p:cNvPr id="221" name="CustomShape 1"/>
+          <p:cNvPr id="225" name="CustomShape 1"/>
           <p:cNvSpPr/>
           <p:nvPr/>
         </p:nvSpPr>
@@ -1169,7 +1371,7 @@
                 <a:spcPct val="100000"/>
               </a:lnSpc>
             </a:pPr>
-            <a:fld id="{596DDC57-03B8-4F52-A31B-3DB8878FD5E4}" type="slidenum">
+            <a:fld id="{5B6DBC8B-3603-4454-AB97-CC80F01121EB}" type="slidenum">
               <a:rPr lang="en-US" sz="1400" spc="-1" strike="noStrike">
                 <a:solidFill>
                   <a:srgbClr val="000000"/>
@@ -1190,7 +1392,7 @@
       </p:sp>
       <p:sp>
         <p:nvSpPr>
-          <p:cNvPr id="222" name="PlaceHolder 2"/>
+          <p:cNvPr id="226" name="PlaceHolder 2"/>
           <p:cNvSpPr>
             <a:spLocks noGrp="1"/>
           </p:cNvSpPr>
@@ -1238,7 +1440,7 @@
       </p:grpSpPr>
       <p:sp>
         <p:nvSpPr>
-          <p:cNvPr id="223" name="CustomShape 1"/>
+          <p:cNvPr id="227" name="CustomShape 1"/>
           <p:cNvSpPr/>
           <p:nvPr/>
         </p:nvSpPr>
@@ -1269,7 +1471,7 @@
                 <a:spcPct val="100000"/>
               </a:lnSpc>
             </a:pPr>
-            <a:fld id="{06AB6482-91DC-429C-A606-539ADF167336}" type="slidenum">
+            <a:fld id="{318ED2BA-DA78-4922-B582-803722EDB076}" type="slidenum">
               <a:rPr lang="en-US" sz="1400" spc="-1" strike="noStrike">
                 <a:solidFill>
                   <a:srgbClr val="000000"/>
@@ -1290,7 +1492,7 @@
       </p:sp>
       <p:sp>
         <p:nvSpPr>
-          <p:cNvPr id="224" name="PlaceHolder 2"/>
+          <p:cNvPr id="228" name="PlaceHolder 2"/>
           <p:cNvSpPr>
             <a:spLocks noGrp="1"/>
           </p:cNvSpPr>
@@ -1338,7 +1540,7 @@
       </p:grpSpPr>
       <p:sp>
         <p:nvSpPr>
-          <p:cNvPr id="225" name="CustomShape 1"/>
+          <p:cNvPr id="229" name="CustomShape 1"/>
           <p:cNvSpPr/>
           <p:nvPr/>
         </p:nvSpPr>
@@ -1369,7 +1571,7 @@
                 <a:spcPct val="100000"/>
               </a:lnSpc>
             </a:pPr>
-            <a:fld id="{85410103-7436-4EA4-8F49-5525F79BC85A}" type="slidenum">
+            <a:fld id="{B8DC76D5-B080-4E06-910F-163453A57572}" type="slidenum">
               <a:rPr lang="en-US" sz="1400" spc="-1" strike="noStrike">
                 <a:solidFill>
                   <a:srgbClr val="000000"/>
@@ -1390,7 +1592,7 @@
       </p:sp>
       <p:sp>
         <p:nvSpPr>
-          <p:cNvPr id="226" name="PlaceHolder 2"/>
+          <p:cNvPr id="230" name="PlaceHolder 2"/>
           <p:cNvSpPr>
             <a:spLocks noGrp="1"/>
           </p:cNvSpPr>
@@ -1438,7 +1640,7 @@
       </p:grpSpPr>
       <p:sp>
         <p:nvSpPr>
-          <p:cNvPr id="227" name="CustomShape 1"/>
+          <p:cNvPr id="231" name="CustomShape 1"/>
           <p:cNvSpPr/>
           <p:nvPr/>
         </p:nvSpPr>
@@ -1469,7 +1671,7 @@
                 <a:spcPct val="100000"/>
               </a:lnSpc>
             </a:pPr>
-            <a:fld id="{3E5D1FB2-2DDF-4459-BEE2-2C1B85305291}" type="slidenum">
+            <a:fld id="{FC76B164-4B5C-441B-B998-FF06F444B268}" type="slidenum">
               <a:rPr lang="en-US" sz="1400" spc="-1" strike="noStrike">
                 <a:solidFill>
                   <a:srgbClr val="000000"/>
@@ -1490,7 +1692,7 @@
       </p:sp>
       <p:sp>
         <p:nvSpPr>
-          <p:cNvPr id="228" name="PlaceHolder 2"/>
+          <p:cNvPr id="232" name="PlaceHolder 2"/>
           <p:cNvSpPr>
             <a:spLocks noGrp="1"/>
           </p:cNvSpPr>
@@ -11051,8 +11253,8 @@
         </p:nvSpPr>
         <p:spPr>
           <a:xfrm>
-            <a:off x="1982160" y="2895480"/>
-            <a:ext cx="8223840" cy="387720"/>
+            <a:off x="274320" y="635040"/>
+            <a:ext cx="9786960" cy="645120"/>
           </a:xfrm>
           <a:prstGeom prst="rect">
             <a:avLst/>
@@ -11069,15 +11271,15 @@
           <a:fontRef idx="minor"/>
         </p:style>
         <p:txBody>
-          <a:bodyPr lIns="90000" rIns="90000" tIns="91440" bIns="45000"/>
-          <a:p>
-            <a:pPr algn="ctr">
+          <a:bodyPr lIns="90000" rIns="90000" tIns="112680" bIns="45000"/>
+          <a:p>
+            <a:pPr>
               <a:lnSpc>
                 <a:spcPct val="100000"/>
               </a:lnSpc>
             </a:pPr>
             <a:r>
-              <a:rPr b="1" lang="en-US" sz="3200" spc="-1" strike="noStrike">
+              <a:rPr b="1" lang="en-US" sz="2400" spc="-1" strike="noStrike">
                 <a:solidFill>
                   <a:srgbClr val="002060"/>
                 </a:solidFill>
@@ -11089,8 +11291,71 @@
                 <a:latin typeface="Arial"/>
                 <a:ea typeface="MS PGothic"/>
               </a:rPr>
-              <a:t>Questions?</a:t>
-            </a:r>
+              <a:t>Test application – install Chrome REST client</a:t>
+            </a:r>
+            <a:endParaRPr/>
+          </a:p>
+        </p:txBody>
+      </p:sp>
+      <p:sp>
+        <p:nvSpPr>
+          <p:cNvPr id="211" name="CustomShape 2"/>
+          <p:cNvSpPr/>
+          <p:nvPr/>
+        </p:nvSpPr>
+        <p:spPr>
+          <a:xfrm>
+            <a:off x="274320" y="1280160"/>
+            <a:ext cx="11612880" cy="5120640"/>
+          </a:xfrm>
+          <a:prstGeom prst="rect">
+            <a:avLst/>
+          </a:prstGeom>
+          <a:noFill/>
+          <a:ln>
+            <a:noFill/>
+          </a:ln>
+        </p:spPr>
+        <p:style>
+          <a:lnRef idx="0"/>
+          <a:fillRef idx="0"/>
+          <a:effectRef idx="0"/>
+          <a:fontRef idx="minor"/>
+        </p:style>
+        <p:txBody>
+          <a:bodyPr lIns="90000" rIns="90000" tIns="45000" bIns="45000"/>
+          <a:p>
+            <a:r>
+              <a:rPr lang="en-US" sz="1800" spc="-1" strike="noStrike">
+                <a:uFill>
+                  <a:solidFill>
+                    <a:srgbClr val="ffffff"/>
+                  </a:solidFill>
+                </a:uFill>
+                <a:latin typeface="Arial"/>
+              </a:rPr>
+              <a:t>Download and install Chrome REST client:</a:t>
+            </a:r>
+            <a:endParaRPr/>
+          </a:p>
+          <a:p>
+            <a:r>
+              <a:rPr lang="en-US" sz="1800" spc="-1" strike="noStrike">
+                <a:uFill>
+                  <a:solidFill>
+                    <a:srgbClr val="ffffff"/>
+                  </a:solidFill>
+                </a:uFill>
+                <a:latin typeface="Arial"/>
+              </a:rPr>
+              <a:t>https://chrome.google.com/webstore/detail/advanced-rest-client/hgmloofddffdnphfgcellkdfbfbjeloo?hl=en-US</a:t>
+            </a:r>
+            <a:endParaRPr/>
+          </a:p>
+          <a:p>
+            <a:endParaRPr/>
+          </a:p>
+          <a:p>
             <a:endParaRPr/>
           </a:p>
         </p:txBody>
@@ -11104,6 +11369,257 @@
           <p:childTnLst>
             <p:seq>
               <p:cTn id="28" nodeType="mainSeq"/>
+              <p:prevCondLst>
+                <p:cond delay="0" evt="onPrev">
+                  <p:tgtEl>
+                    <p:sldTgt/>
+                  </p:tgtEl>
+                </p:cond>
+              </p:prevCondLst>
+              <p:nextCondLst>
+                <p:cond delay="0" evt="onNext">
+                  <p:tgtEl>
+                    <p:sldTgt/>
+                  </p:tgtEl>
+                </p:cond>
+              </p:nextCondLst>
+            </p:seq>
+          </p:childTnLst>
+        </p:cTn>
+      </p:par>
+    </p:tnLst>
+  </p:timing>
+</p:sld>
+</file>
+
+<file path=ppt/slides/slide15.xml><?xml version="1.0" encoding="utf-8"?>
+<p:sld xmlns:a="http://schemas.openxmlformats.org/drawingml/2006/main" xmlns:p="http://schemas.openxmlformats.org/presentationml/2006/main" xmlns:r="http://schemas.openxmlformats.org/officeDocument/2006/relationships">
+  <p:cSld>
+    <p:spTree>
+      <p:nvGrpSpPr>
+        <p:cNvPr id="1" name=""/>
+        <p:cNvGrpSpPr/>
+        <p:nvPr/>
+      </p:nvGrpSpPr>
+      <p:grpSpPr>
+        <a:xfrm>
+          <a:off x="0" y="0"/>
+          <a:ext cx="0" cy="0"/>
+          <a:chOff x="0" y="0"/>
+          <a:chExt cx="0" cy="0"/>
+        </a:xfrm>
+      </p:grpSpPr>
+      <p:sp>
+        <p:nvSpPr>
+          <p:cNvPr id="212" name="CustomShape 1"/>
+          <p:cNvSpPr/>
+          <p:nvPr/>
+        </p:nvSpPr>
+        <p:spPr>
+          <a:xfrm>
+            <a:off x="274320" y="635040"/>
+            <a:ext cx="9786960" cy="645120"/>
+          </a:xfrm>
+          <a:prstGeom prst="rect">
+            <a:avLst/>
+          </a:prstGeom>
+          <a:noFill/>
+          <a:ln>
+            <a:noFill/>
+          </a:ln>
+        </p:spPr>
+        <p:style>
+          <a:lnRef idx="0"/>
+          <a:fillRef idx="0"/>
+          <a:effectRef idx="0"/>
+          <a:fontRef idx="minor"/>
+        </p:style>
+        <p:txBody>
+          <a:bodyPr lIns="90000" rIns="90000" tIns="112680" bIns="45000"/>
+          <a:p>
+            <a:pPr>
+              <a:lnSpc>
+                <a:spcPct val="100000"/>
+              </a:lnSpc>
+            </a:pPr>
+            <a:r>
+              <a:rPr b="1" lang="en-US" sz="2400" spc="-1" strike="noStrike">
+                <a:solidFill>
+                  <a:srgbClr val="002060"/>
+                </a:solidFill>
+                <a:uFill>
+                  <a:solidFill>
+                    <a:srgbClr val="ffffff"/>
+                  </a:solidFill>
+                </a:uFill>
+                <a:latin typeface="Arial"/>
+                <a:ea typeface="MS PGothic"/>
+              </a:rPr>
+              <a:t>Test application – test Cloudant getDatabases</a:t>
+            </a:r>
+            <a:endParaRPr/>
+          </a:p>
+        </p:txBody>
+      </p:sp>
+      <p:sp>
+        <p:nvSpPr>
+          <p:cNvPr id="213" name="CustomShape 2"/>
+          <p:cNvSpPr/>
+          <p:nvPr/>
+        </p:nvSpPr>
+        <p:spPr>
+          <a:xfrm>
+            <a:off x="274320" y="1280160"/>
+            <a:ext cx="11612880" cy="5120640"/>
+          </a:xfrm>
+          <a:prstGeom prst="rect">
+            <a:avLst/>
+          </a:prstGeom>
+          <a:noFill/>
+          <a:ln>
+            <a:noFill/>
+          </a:ln>
+        </p:spPr>
+        <p:style>
+          <a:lnRef idx="0"/>
+          <a:fillRef idx="0"/>
+          <a:effectRef idx="0"/>
+          <a:fontRef idx="minor"/>
+        </p:style>
+        <p:txBody>
+          <a:bodyPr lIns="90000" rIns="90000" tIns="45000" bIns="45000"/>
+          <a:p>
+            <a:r>
+              <a:rPr lang="en-US" sz="1800" spc="-1" strike="noStrike">
+                <a:uFill>
+                  <a:solidFill>
+                    <a:srgbClr val="ffffff"/>
+                  </a:solidFill>
+                </a:uFill>
+                <a:latin typeface="Arial"/>
+              </a:rPr>
+              <a:t>In Chrome REST client enter this URL:</a:t>
+            </a:r>
+            <a:endParaRPr/>
+          </a:p>
+          <a:p>
+            <a:endParaRPr/>
+          </a:p>
+          <a:p>
+            <a:endParaRPr/>
+          </a:p>
+        </p:txBody>
+      </p:sp>
+    </p:spTree>
+  </p:cSld>
+  <p:timing>
+    <p:tnLst>
+      <p:par>
+        <p:cTn id="29" dur="indefinite" restart="never" nodeType="tmRoot">
+          <p:childTnLst>
+            <p:seq>
+              <p:cTn id="30" nodeType="mainSeq"/>
+              <p:prevCondLst>
+                <p:cond delay="0" evt="onPrev">
+                  <p:tgtEl>
+                    <p:sldTgt/>
+                  </p:tgtEl>
+                </p:cond>
+              </p:prevCondLst>
+              <p:nextCondLst>
+                <p:cond delay="0" evt="onNext">
+                  <p:tgtEl>
+                    <p:sldTgt/>
+                  </p:tgtEl>
+                </p:cond>
+              </p:nextCondLst>
+            </p:seq>
+          </p:childTnLst>
+        </p:cTn>
+      </p:par>
+    </p:tnLst>
+  </p:timing>
+</p:sld>
+</file>
+
+<file path=ppt/slides/slide16.xml><?xml version="1.0" encoding="utf-8"?>
+<p:sld xmlns:a="http://schemas.openxmlformats.org/drawingml/2006/main" xmlns:p="http://schemas.openxmlformats.org/presentationml/2006/main" xmlns:r="http://schemas.openxmlformats.org/officeDocument/2006/relationships">
+  <p:cSld>
+    <p:spTree>
+      <p:nvGrpSpPr>
+        <p:cNvPr id="1" name=""/>
+        <p:cNvGrpSpPr/>
+        <p:nvPr/>
+      </p:nvGrpSpPr>
+      <p:grpSpPr>
+        <a:xfrm>
+          <a:off x="0" y="0"/>
+          <a:ext cx="0" cy="0"/>
+          <a:chOff x="0" y="0"/>
+          <a:chExt cx="0" cy="0"/>
+        </a:xfrm>
+      </p:grpSpPr>
+      <p:sp>
+        <p:nvSpPr>
+          <p:cNvPr id="214" name="CustomShape 1"/>
+          <p:cNvSpPr/>
+          <p:nvPr/>
+        </p:nvSpPr>
+        <p:spPr>
+          <a:xfrm>
+            <a:off x="1982160" y="2895480"/>
+            <a:ext cx="8223840" cy="387720"/>
+          </a:xfrm>
+          <a:prstGeom prst="rect">
+            <a:avLst/>
+          </a:prstGeom>
+          <a:noFill/>
+          <a:ln>
+            <a:noFill/>
+          </a:ln>
+        </p:spPr>
+        <p:style>
+          <a:lnRef idx="0"/>
+          <a:fillRef idx="0"/>
+          <a:effectRef idx="0"/>
+          <a:fontRef idx="minor"/>
+        </p:style>
+        <p:txBody>
+          <a:bodyPr lIns="90000" rIns="90000" tIns="91440" bIns="45000"/>
+          <a:p>
+            <a:pPr algn="ctr">
+              <a:lnSpc>
+                <a:spcPct val="100000"/>
+              </a:lnSpc>
+            </a:pPr>
+            <a:r>
+              <a:rPr b="1" lang="en-US" sz="3200" spc="-1" strike="noStrike">
+                <a:solidFill>
+                  <a:srgbClr val="002060"/>
+                </a:solidFill>
+                <a:uFill>
+                  <a:solidFill>
+                    <a:srgbClr val="ffffff"/>
+                  </a:solidFill>
+                </a:uFill>
+                <a:latin typeface="Arial"/>
+                <a:ea typeface="MS PGothic"/>
+              </a:rPr>
+              <a:t>Questions?</a:t>
+            </a:r>
+            <a:endParaRPr/>
+          </a:p>
+        </p:txBody>
+      </p:sp>
+    </p:spTree>
+  </p:cSld>
+  <p:timing>
+    <p:tnLst>
+      <p:par>
+        <p:cTn id="31" dur="indefinite" restart="never" nodeType="tmRoot">
+          <p:childTnLst>
+            <p:seq>
+              <p:cTn id="32" nodeType="mainSeq"/>
               <p:prevCondLst>
                 <p:cond delay="0" evt="onPrev">
                   <p:tgtEl>

</xml_diff>